<commit_message>
Moved design process to .txt and added to it.
</commit_message>
<xml_diff>
--- a/docs/Mockups/First Draft/Draft Achievements Mockup.pptx
+++ b/docs/Mockups/First Draft/Draft Achievements Mockup.pptx
@@ -192,7 +192,7 @@
           <a:p>
             <a:fld id="{525AA60E-18AB-40F1-9DE9-641057994E11}" type="datetimeFigureOut">
               <a:rPr lang="en-US" smtClean="0"/>
-              <a:t>1/16/2014</a:t>
+              <a:t>1/17/2014</a:t>
             </a:fld>
             <a:endParaRPr lang="en-US"/>
           </a:p>
@@ -733,7 +733,7 @@
           <a:p>
             <a:fld id="{ECB3C1DC-EE09-436C-876C-1E4BB35BFE0C}" type="datetimeFigureOut">
               <a:rPr lang="en-US" smtClean="0"/>
-              <a:t>1/16/2014</a:t>
+              <a:t>1/17/2014</a:t>
             </a:fld>
             <a:endParaRPr lang="en-US"/>
           </a:p>
@@ -903,7 +903,7 @@
           <a:p>
             <a:fld id="{ECB3C1DC-EE09-436C-876C-1E4BB35BFE0C}" type="datetimeFigureOut">
               <a:rPr lang="en-US" smtClean="0"/>
-              <a:t>1/16/2014</a:t>
+              <a:t>1/17/2014</a:t>
             </a:fld>
             <a:endParaRPr lang="en-US"/>
           </a:p>
@@ -1083,7 +1083,7 @@
           <a:p>
             <a:fld id="{ECB3C1DC-EE09-436C-876C-1E4BB35BFE0C}" type="datetimeFigureOut">
               <a:rPr lang="en-US" smtClean="0"/>
-              <a:t>1/16/2014</a:t>
+              <a:t>1/17/2014</a:t>
             </a:fld>
             <a:endParaRPr lang="en-US"/>
           </a:p>
@@ -1253,7 +1253,7 @@
           <a:p>
             <a:fld id="{ECB3C1DC-EE09-436C-876C-1E4BB35BFE0C}" type="datetimeFigureOut">
               <a:rPr lang="en-US" smtClean="0"/>
-              <a:t>1/16/2014</a:t>
+              <a:t>1/17/2014</a:t>
             </a:fld>
             <a:endParaRPr lang="en-US"/>
           </a:p>
@@ -1499,7 +1499,7 @@
           <a:p>
             <a:fld id="{ECB3C1DC-EE09-436C-876C-1E4BB35BFE0C}" type="datetimeFigureOut">
               <a:rPr lang="en-US" smtClean="0"/>
-              <a:t>1/16/2014</a:t>
+              <a:t>1/17/2014</a:t>
             </a:fld>
             <a:endParaRPr lang="en-US"/>
           </a:p>
@@ -1787,7 +1787,7 @@
           <a:p>
             <a:fld id="{ECB3C1DC-EE09-436C-876C-1E4BB35BFE0C}" type="datetimeFigureOut">
               <a:rPr lang="en-US" smtClean="0"/>
-              <a:t>1/16/2014</a:t>
+              <a:t>1/17/2014</a:t>
             </a:fld>
             <a:endParaRPr lang="en-US"/>
           </a:p>
@@ -2209,7 +2209,7 @@
           <a:p>
             <a:fld id="{ECB3C1DC-EE09-436C-876C-1E4BB35BFE0C}" type="datetimeFigureOut">
               <a:rPr lang="en-US" smtClean="0"/>
-              <a:t>1/16/2014</a:t>
+              <a:t>1/17/2014</a:t>
             </a:fld>
             <a:endParaRPr lang="en-US"/>
           </a:p>
@@ -2327,7 +2327,7 @@
           <a:p>
             <a:fld id="{ECB3C1DC-EE09-436C-876C-1E4BB35BFE0C}" type="datetimeFigureOut">
               <a:rPr lang="en-US" smtClean="0"/>
-              <a:t>1/16/2014</a:t>
+              <a:t>1/17/2014</a:t>
             </a:fld>
             <a:endParaRPr lang="en-US"/>
           </a:p>
@@ -2422,7 +2422,7 @@
           <a:p>
             <a:fld id="{ECB3C1DC-EE09-436C-876C-1E4BB35BFE0C}" type="datetimeFigureOut">
               <a:rPr lang="en-US" smtClean="0"/>
-              <a:t>1/16/2014</a:t>
+              <a:t>1/17/2014</a:t>
             </a:fld>
             <a:endParaRPr lang="en-US"/>
           </a:p>
@@ -2699,7 +2699,7 @@
           <a:p>
             <a:fld id="{ECB3C1DC-EE09-436C-876C-1E4BB35BFE0C}" type="datetimeFigureOut">
               <a:rPr lang="en-US" smtClean="0"/>
-              <a:t>1/16/2014</a:t>
+              <a:t>1/17/2014</a:t>
             </a:fld>
             <a:endParaRPr lang="en-US"/>
           </a:p>
@@ -2952,7 +2952,7 @@
           <a:p>
             <a:fld id="{ECB3C1DC-EE09-436C-876C-1E4BB35BFE0C}" type="datetimeFigureOut">
               <a:rPr lang="en-US" smtClean="0"/>
-              <a:t>1/16/2014</a:t>
+              <a:t>1/17/2014</a:t>
             </a:fld>
             <a:endParaRPr lang="en-US"/>
           </a:p>
@@ -3165,7 +3165,7 @@
           <a:p>
             <a:fld id="{ECB3C1DC-EE09-436C-876C-1E4BB35BFE0C}" type="datetimeFigureOut">
               <a:rPr lang="en-US" smtClean="0"/>
-              <a:t>1/16/2014</a:t>
+              <a:t>1/17/2014</a:t>
             </a:fld>
             <a:endParaRPr lang="en-US"/>
           </a:p>
@@ -3686,12 +3686,12 @@
           </a:prstGeom>
           <a:gradFill>
             <a:gsLst>
-              <a:gs pos="53000">
+              <a:gs pos="40000">
                 <a:schemeClr val="bg1"/>
               </a:gs>
               <a:gs pos="100000">
                 <a:schemeClr val="bg1">
-                  <a:lumMod val="61000"/>
+                  <a:lumMod val="32000"/>
                 </a:schemeClr>
               </a:gs>
             </a:gsLst>
@@ -4200,47 +4200,6 @@
           </a:fontRef>
         </p:style>
       </p:cxnSp>
-      <p:pic>
-        <p:nvPicPr>
-          <p:cNvPr id="1026" name="Picture 2" descr="C:\Users\Francis\Documents\From FRANCIS-MITPC\MIT\IAP 2014\6.470\GetBigWith6.470\app\assets\images\background7_square.jpg"/>
-          <p:cNvPicPr>
-            <a:picLocks noChangeAspect="1" noChangeArrowheads="1"/>
-          </p:cNvPicPr>
-          <p:nvPr/>
-        </p:nvPicPr>
-        <p:blipFill>
-          <a:blip r:embed="rId7" cstate="print">
-            <a:extLst>
-              <a:ext uri="{28A0092B-C50C-407E-A947-70E740481C1C}">
-                <a14:useLocalDpi xmlns:a14="http://schemas.microsoft.com/office/drawing/2010/main" val="0"/>
-              </a:ext>
-            </a:extLst>
-          </a:blip>
-          <a:srcRect/>
-          <a:stretch>
-            <a:fillRect/>
-          </a:stretch>
-        </p:blipFill>
-        <p:spPr bwMode="auto">
-          <a:xfrm>
-            <a:off x="423837" y="1452512"/>
-            <a:ext cx="1359098" cy="1359098"/>
-          </a:xfrm>
-          <a:prstGeom prst="rect">
-            <a:avLst/>
-          </a:prstGeom>
-          <a:noFill/>
-          <a:extLst>
-            <a:ext uri="{909E8E84-426E-40DD-AFC4-6F175D3DCCD1}">
-              <a14:hiddenFill xmlns:a14="http://schemas.microsoft.com/office/drawing/2010/main">
-                <a:solidFill>
-                  <a:srgbClr val="FFFFFF"/>
-                </a:solidFill>
-              </a14:hiddenFill>
-            </a:ext>
-          </a:extLst>
-        </p:spPr>
-      </p:pic>
       <p:sp>
         <p:nvSpPr>
           <p:cNvPr id="13" name="Flowchart: Process 12"/>
@@ -4306,47 +4265,6 @@
           </a:p>
         </p:txBody>
       </p:sp>
-      <p:pic>
-        <p:nvPicPr>
-          <p:cNvPr id="5" name="Picture 4" descr="C:\Users\Francis\Documents\From FRANCIS-MITPC\MIT\IAP 2014\6.470\GetBigWith6.470\app\assets\images\background15_square.jpg"/>
-          <p:cNvPicPr>
-            <a:picLocks noChangeAspect="1" noChangeArrowheads="1"/>
-          </p:cNvPicPr>
-          <p:nvPr/>
-        </p:nvPicPr>
-        <p:blipFill>
-          <a:blip r:embed="rId8" cstate="print">
-            <a:extLst>
-              <a:ext uri="{28A0092B-C50C-407E-A947-70E740481C1C}">
-                <a14:useLocalDpi xmlns:a14="http://schemas.microsoft.com/office/drawing/2010/main" val="0"/>
-              </a:ext>
-            </a:extLst>
-          </a:blip>
-          <a:srcRect/>
-          <a:stretch>
-            <a:fillRect/>
-          </a:stretch>
-        </p:blipFill>
-        <p:spPr bwMode="auto">
-          <a:xfrm>
-            <a:off x="2832548" y="1452512"/>
-            <a:ext cx="1358346" cy="1359098"/>
-          </a:xfrm>
-          <a:prstGeom prst="rect">
-            <a:avLst/>
-          </a:prstGeom>
-          <a:noFill/>
-          <a:extLst>
-            <a:ext uri="{909E8E84-426E-40DD-AFC4-6F175D3DCCD1}">
-              <a14:hiddenFill xmlns:a14="http://schemas.microsoft.com/office/drawing/2010/main">
-                <a:solidFill>
-                  <a:srgbClr val="FFFFFF"/>
-                </a:solidFill>
-              </a14:hiddenFill>
-            </a:ext>
-          </a:extLst>
-        </p:spPr>
-      </p:pic>
       <p:sp>
         <p:nvSpPr>
           <p:cNvPr id="6" name="TextBox 5"/>
@@ -4462,11 +4380,11 @@
           <p:nvPr/>
         </p:nvPicPr>
         <p:blipFill>
-          <a:blip r:embed="rId9" cstate="print">
+          <a:blip r:embed="rId7" cstate="print">
             <a:extLst>
               <a:ext uri="{BEBA8EAE-BF5A-486C-A8C5-ECC9F3942E4B}">
                 <a14:imgProps xmlns:a14="http://schemas.microsoft.com/office/drawing/2010/main">
-                  <a14:imgLayer r:embed="rId10">
+                  <a14:imgLayer r:embed="rId8">
                     <a14:imgEffect>
                       <a14:saturation sat="0"/>
                     </a14:imgEffect>
@@ -4550,11 +4468,11 @@
           <p:nvPr/>
         </p:nvPicPr>
         <p:blipFill>
-          <a:blip r:embed="rId11" cstate="print">
+          <a:blip r:embed="rId9" cstate="print">
             <a:extLst>
               <a:ext uri="{BEBA8EAE-BF5A-486C-A8C5-ECC9F3942E4B}">
                 <a14:imgProps xmlns:a14="http://schemas.microsoft.com/office/drawing/2010/main">
-                  <a14:imgLayer r:embed="rId12">
+                  <a14:imgLayer r:embed="rId10">
                     <a14:imgEffect>
                       <a14:saturation sat="0"/>
                     </a14:imgEffect>
@@ -4777,7 +4695,7 @@
           <p:nvPr/>
         </p:nvPicPr>
         <p:blipFill>
-          <a:blip r:embed="rId13" cstate="print">
+          <a:blip r:embed="rId11" cstate="print">
             <a:extLst>
               <a:ext uri="{28A0092B-C50C-407E-A947-70E740481C1C}">
                 <a14:useLocalDpi xmlns:a14="http://schemas.microsoft.com/office/drawing/2010/main" val="0"/>
@@ -4871,7 +4789,7 @@
           <p:nvPr/>
         </p:nvPicPr>
         <p:blipFill>
-          <a:blip r:embed="rId13" cstate="print">
+          <a:blip r:embed="rId11" cstate="print">
             <a:extLst>
               <a:ext uri="{28A0092B-C50C-407E-A947-70E740481C1C}">
                 <a14:useLocalDpi xmlns:a14="http://schemas.microsoft.com/office/drawing/2010/main" val="0"/>
@@ -4956,6 +4874,47 @@
           </a:p>
         </p:txBody>
       </p:sp>
+      <p:pic>
+        <p:nvPicPr>
+          <p:cNvPr id="1036" name="Picture 12" descr="C:\Users\Francis\Documents\From FRANCIS-MITPC\MIT\IAP 2014\6.470\GetBigWith6.470\app\assets\images\achievement5_square.jpg"/>
+          <p:cNvPicPr>
+            <a:picLocks noChangeAspect="1" noChangeArrowheads="1"/>
+          </p:cNvPicPr>
+          <p:nvPr/>
+        </p:nvPicPr>
+        <p:blipFill>
+          <a:blip r:embed="rId12" cstate="print">
+            <a:extLst>
+              <a:ext uri="{28A0092B-C50C-407E-A947-70E740481C1C}">
+                <a14:useLocalDpi xmlns:a14="http://schemas.microsoft.com/office/drawing/2010/main" val="0"/>
+              </a:ext>
+            </a:extLst>
+          </a:blip>
+          <a:srcRect/>
+          <a:stretch>
+            <a:fillRect/>
+          </a:stretch>
+        </p:blipFill>
+        <p:spPr bwMode="auto">
+          <a:xfrm>
+            <a:off x="2842350" y="1462690"/>
+            <a:ext cx="1338742" cy="1338742"/>
+          </a:xfrm>
+          <a:prstGeom prst="rect">
+            <a:avLst/>
+          </a:prstGeom>
+          <a:noFill/>
+          <a:extLst>
+            <a:ext uri="{909E8E84-426E-40DD-AFC4-6F175D3DCCD1}">
+              <a14:hiddenFill xmlns:a14="http://schemas.microsoft.com/office/drawing/2010/main">
+                <a:solidFill>
+                  <a:srgbClr val="FFFFFF"/>
+                </a:solidFill>
+              </a14:hiddenFill>
+            </a:ext>
+          </a:extLst>
+        </p:spPr>
+      </p:pic>
     </p:spTree>
     <p:extLst>
       <p:ext uri="{BB962C8B-B14F-4D97-AF65-F5344CB8AC3E}">

</xml_diff>

<commit_message>
Fixed issues with goals and dashboard pages.
</commit_message>
<xml_diff>
--- a/docs/Mockups/First Draft/Draft Achievements Mockup.pptx
+++ b/docs/Mockups/First Draft/Draft Achievements Mockup.pptx
@@ -4874,50 +4874,6 @@
           </a:p>
         </p:txBody>
       </p:sp>
-      <p:pic>
-        <p:nvPicPr>
-          <p:cNvPr id="1026" name="Picture 2" descr="C:\Users\Francis\Documents\From FRANCIS-MITPC\MIT\IAP 2014\6.470\GetBigWith6.470\app\assets\images\achievement1_square.jpg"/>
-          <p:cNvPicPr>
-            <a:picLocks noChangeAspect="1" noChangeArrowheads="1"/>
-          </p:cNvPicPr>
-          <p:nvPr/>
-        </p:nvPicPr>
-        <p:blipFill>
-          <a:blip r:embed="rId12" cstate="print">
-            <a:extLst>
-              <a:ext uri="{28A0092B-C50C-407E-A947-70E740481C1C}">
-                <a14:useLocalDpi xmlns:a14="http://schemas.microsoft.com/office/drawing/2010/main" val="0"/>
-              </a:ext>
-            </a:extLst>
-          </a:blip>
-          <a:srcRect/>
-          <a:stretch>
-            <a:fillRect/>
-          </a:stretch>
-        </p:blipFill>
-        <p:spPr bwMode="auto">
-          <a:xfrm>
-            <a:off x="2775874" y="1396214"/>
-            <a:ext cx="1471693" cy="1471693"/>
-          </a:xfrm>
-          <a:prstGeom prst="rect">
-            <a:avLst/>
-          </a:prstGeom>
-          <a:noFill/>
-          <a:effectLst>
-            <a:softEdge rad="127000"/>
-          </a:effectLst>
-          <a:extLst>
-            <a:ext uri="{909E8E84-426E-40DD-AFC4-6F175D3DCCD1}">
-              <a14:hiddenFill xmlns:a14="http://schemas.microsoft.com/office/drawing/2010/main">
-                <a:solidFill>
-                  <a:srgbClr val="FFFFFF"/>
-                </a:solidFill>
-              </a14:hiddenFill>
-            </a:ext>
-          </a:extLst>
-        </p:spPr>
-      </p:pic>
     </p:spTree>
     <p:extLst>
       <p:ext uri="{BB962C8B-B14F-4D97-AF65-F5344CB8AC3E}">

</xml_diff>

<commit_message>
lots of achievement images. You have been warned.
</commit_message>
<xml_diff>
--- a/docs/Mockups/First Draft/Draft Achievements Mockup.pptx
+++ b/docs/Mockups/First Draft/Draft Achievements Mockup.pptx
@@ -107,6 +107,22 @@
       </a:defRPr>
     </a:lvl9pPr>
   </p:defaultTextStyle>
+  <p:extLst>
+    <p:ext uri="{EFAFB233-063F-42B5-8137-9DF3F51BA10A}">
+      <p15:sldGuideLst xmlns:p15="http://schemas.microsoft.com/office/powerpoint/2012/main">
+        <p15:guide id="1" orient="horz" pos="2160">
+          <p15:clr>
+            <a:srgbClr val="A4A3A4"/>
+          </p15:clr>
+        </p15:guide>
+        <p15:guide id="2" pos="2880">
+          <p15:clr>
+            <a:srgbClr val="A4A3A4"/>
+          </p15:clr>
+        </p15:guide>
+      </p15:sldGuideLst>
+    </p:ext>
+  </p:extLst>
 </p:presentation>
 </file>
 
@@ -192,7 +208,7 @@
           <a:p>
             <a:fld id="{525AA60E-18AB-40F1-9DE9-641057994E11}" type="datetimeFigureOut">
               <a:rPr lang="en-US" smtClean="0"/>
-              <a:t>1/18/2014</a:t>
+              <a:t>1/23/2014</a:t>
             </a:fld>
             <a:endParaRPr lang="en-US"/>
           </a:p>
@@ -733,7 +749,7 @@
           <a:p>
             <a:fld id="{ECB3C1DC-EE09-436C-876C-1E4BB35BFE0C}" type="datetimeFigureOut">
               <a:rPr lang="en-US" smtClean="0"/>
-              <a:t>1/18/2014</a:t>
+              <a:t>1/23/2014</a:t>
             </a:fld>
             <a:endParaRPr lang="en-US"/>
           </a:p>
@@ -903,7 +919,7 @@
           <a:p>
             <a:fld id="{ECB3C1DC-EE09-436C-876C-1E4BB35BFE0C}" type="datetimeFigureOut">
               <a:rPr lang="en-US" smtClean="0"/>
-              <a:t>1/18/2014</a:t>
+              <a:t>1/23/2014</a:t>
             </a:fld>
             <a:endParaRPr lang="en-US"/>
           </a:p>
@@ -1083,7 +1099,7 @@
           <a:p>
             <a:fld id="{ECB3C1DC-EE09-436C-876C-1E4BB35BFE0C}" type="datetimeFigureOut">
               <a:rPr lang="en-US" smtClean="0"/>
-              <a:t>1/18/2014</a:t>
+              <a:t>1/23/2014</a:t>
             </a:fld>
             <a:endParaRPr lang="en-US"/>
           </a:p>
@@ -1253,7 +1269,7 @@
           <a:p>
             <a:fld id="{ECB3C1DC-EE09-436C-876C-1E4BB35BFE0C}" type="datetimeFigureOut">
               <a:rPr lang="en-US" smtClean="0"/>
-              <a:t>1/18/2014</a:t>
+              <a:t>1/23/2014</a:t>
             </a:fld>
             <a:endParaRPr lang="en-US"/>
           </a:p>
@@ -1499,7 +1515,7 @@
           <a:p>
             <a:fld id="{ECB3C1DC-EE09-436C-876C-1E4BB35BFE0C}" type="datetimeFigureOut">
               <a:rPr lang="en-US" smtClean="0"/>
-              <a:t>1/18/2014</a:t>
+              <a:t>1/23/2014</a:t>
             </a:fld>
             <a:endParaRPr lang="en-US"/>
           </a:p>
@@ -1787,7 +1803,7 @@
           <a:p>
             <a:fld id="{ECB3C1DC-EE09-436C-876C-1E4BB35BFE0C}" type="datetimeFigureOut">
               <a:rPr lang="en-US" smtClean="0"/>
-              <a:t>1/18/2014</a:t>
+              <a:t>1/23/2014</a:t>
             </a:fld>
             <a:endParaRPr lang="en-US"/>
           </a:p>
@@ -2209,7 +2225,7 @@
           <a:p>
             <a:fld id="{ECB3C1DC-EE09-436C-876C-1E4BB35BFE0C}" type="datetimeFigureOut">
               <a:rPr lang="en-US" smtClean="0"/>
-              <a:t>1/18/2014</a:t>
+              <a:t>1/23/2014</a:t>
             </a:fld>
             <a:endParaRPr lang="en-US"/>
           </a:p>
@@ -2327,7 +2343,7 @@
           <a:p>
             <a:fld id="{ECB3C1DC-EE09-436C-876C-1E4BB35BFE0C}" type="datetimeFigureOut">
               <a:rPr lang="en-US" smtClean="0"/>
-              <a:t>1/18/2014</a:t>
+              <a:t>1/23/2014</a:t>
             </a:fld>
             <a:endParaRPr lang="en-US"/>
           </a:p>
@@ -2422,7 +2438,7 @@
           <a:p>
             <a:fld id="{ECB3C1DC-EE09-436C-876C-1E4BB35BFE0C}" type="datetimeFigureOut">
               <a:rPr lang="en-US" smtClean="0"/>
-              <a:t>1/18/2014</a:t>
+              <a:t>1/23/2014</a:t>
             </a:fld>
             <a:endParaRPr lang="en-US"/>
           </a:p>
@@ -2699,7 +2715,7 @@
           <a:p>
             <a:fld id="{ECB3C1DC-EE09-436C-876C-1E4BB35BFE0C}" type="datetimeFigureOut">
               <a:rPr lang="en-US" smtClean="0"/>
-              <a:t>1/18/2014</a:t>
+              <a:t>1/23/2014</a:t>
             </a:fld>
             <a:endParaRPr lang="en-US"/>
           </a:p>
@@ -2952,7 +2968,7 @@
           <a:p>
             <a:fld id="{ECB3C1DC-EE09-436C-876C-1E4BB35BFE0C}" type="datetimeFigureOut">
               <a:rPr lang="en-US" smtClean="0"/>
-              <a:t>1/18/2014</a:t>
+              <a:t>1/23/2014</a:t>
             </a:fld>
             <a:endParaRPr lang="en-US"/>
           </a:p>
@@ -3165,7 +3181,7 @@
           <a:p>
             <a:fld id="{ECB3C1DC-EE09-436C-876C-1E4BB35BFE0C}" type="datetimeFigureOut">
               <a:rPr lang="en-US" smtClean="0"/>
-              <a:t>1/18/2014</a:t>
+              <a:t>1/23/2014</a:t>
             </a:fld>
             <a:endParaRPr lang="en-US"/>
           </a:p>
@@ -4874,6 +4890,969 @@
           </a:p>
         </p:txBody>
       </p:sp>
+      <p:pic>
+        <p:nvPicPr>
+          <p:cNvPr id="11" name="Picture 10"/>
+          <p:cNvPicPr>
+            <a:picLocks noChangeAspect="1"/>
+          </p:cNvPicPr>
+          <p:nvPr/>
+        </p:nvPicPr>
+        <p:blipFill>
+          <a:blip r:embed="rId12" cstate="print">
+            <a:extLst>
+              <a:ext uri="{28A0092B-C50C-407E-A947-70E740481C1C}">
+                <a14:useLocalDpi xmlns:a14="http://schemas.microsoft.com/office/drawing/2010/main" val="0"/>
+              </a:ext>
+            </a:extLst>
+          </a:blip>
+          <a:stretch>
+            <a:fillRect/>
+          </a:stretch>
+        </p:blipFill>
+        <p:spPr>
+          <a:xfrm>
+            <a:off x="4170960" y="3027960"/>
+            <a:ext cx="1402080" cy="1402080"/>
+          </a:xfrm>
+          <a:prstGeom prst="rect">
+            <a:avLst/>
+          </a:prstGeom>
+        </p:spPr>
+      </p:pic>
+      <p:pic>
+        <p:nvPicPr>
+          <p:cNvPr id="12" name="Picture 11"/>
+          <p:cNvPicPr>
+            <a:picLocks noChangeAspect="1"/>
+          </p:cNvPicPr>
+          <p:nvPr/>
+        </p:nvPicPr>
+        <p:blipFill>
+          <a:blip r:embed="rId13">
+            <a:extLst>
+              <a:ext uri="{28A0092B-C50C-407E-A947-70E740481C1C}">
+                <a14:useLocalDpi xmlns:a14="http://schemas.microsoft.com/office/drawing/2010/main" val="0"/>
+              </a:ext>
+            </a:extLst>
+          </a:blip>
+          <a:stretch>
+            <a:fillRect/>
+          </a:stretch>
+        </p:blipFill>
+        <p:spPr>
+          <a:xfrm>
+            <a:off x="-3143372" y="3823496"/>
+            <a:ext cx="3505504" cy="3505504"/>
+          </a:xfrm>
+          <a:prstGeom prst="rect">
+            <a:avLst/>
+          </a:prstGeom>
+        </p:spPr>
+      </p:pic>
+      <p:pic>
+        <p:nvPicPr>
+          <p:cNvPr id="14" name="Picture 13"/>
+          <p:cNvPicPr>
+            <a:picLocks noChangeAspect="1"/>
+          </p:cNvPicPr>
+          <p:nvPr/>
+        </p:nvPicPr>
+        <p:blipFill>
+          <a:blip r:embed="rId14" cstate="print">
+            <a:extLst>
+              <a:ext uri="{28A0092B-C50C-407E-A947-70E740481C1C}">
+                <a14:useLocalDpi xmlns:a14="http://schemas.microsoft.com/office/drawing/2010/main" val="0"/>
+              </a:ext>
+            </a:extLst>
+          </a:blip>
+          <a:stretch>
+            <a:fillRect/>
+          </a:stretch>
+        </p:blipFill>
+        <p:spPr>
+          <a:xfrm>
+            <a:off x="4470960" y="3327960"/>
+            <a:ext cx="1402080" cy="1402080"/>
+          </a:xfrm>
+          <a:prstGeom prst="rect">
+            <a:avLst/>
+          </a:prstGeom>
+        </p:spPr>
+      </p:pic>
+      <p:pic>
+        <p:nvPicPr>
+          <p:cNvPr id="15" name="Picture 14"/>
+          <p:cNvPicPr>
+            <a:picLocks noChangeAspect="1"/>
+          </p:cNvPicPr>
+          <p:nvPr/>
+        </p:nvPicPr>
+        <p:blipFill>
+          <a:blip r:embed="rId15" cstate="print">
+            <a:extLst>
+              <a:ext uri="{28A0092B-C50C-407E-A947-70E740481C1C}">
+                <a14:useLocalDpi xmlns:a14="http://schemas.microsoft.com/office/drawing/2010/main" val="0"/>
+              </a:ext>
+            </a:extLst>
+          </a:blip>
+          <a:stretch>
+            <a:fillRect/>
+          </a:stretch>
+        </p:blipFill>
+        <p:spPr>
+          <a:xfrm>
+            <a:off x="4620960" y="3477960"/>
+            <a:ext cx="1402080" cy="1402080"/>
+          </a:xfrm>
+          <a:prstGeom prst="rect">
+            <a:avLst/>
+          </a:prstGeom>
+        </p:spPr>
+      </p:pic>
+      <p:pic>
+        <p:nvPicPr>
+          <p:cNvPr id="16" name="Picture 15"/>
+          <p:cNvPicPr>
+            <a:picLocks noChangeAspect="1"/>
+          </p:cNvPicPr>
+          <p:nvPr/>
+        </p:nvPicPr>
+        <p:blipFill>
+          <a:blip r:embed="rId16" cstate="print">
+            <a:extLst>
+              <a:ext uri="{28A0092B-C50C-407E-A947-70E740481C1C}">
+                <a14:useLocalDpi xmlns:a14="http://schemas.microsoft.com/office/drawing/2010/main" val="0"/>
+              </a:ext>
+            </a:extLst>
+          </a:blip>
+          <a:stretch>
+            <a:fillRect/>
+          </a:stretch>
+        </p:blipFill>
+        <p:spPr>
+          <a:xfrm>
+            <a:off x="4770960" y="3627960"/>
+            <a:ext cx="1402080" cy="1402080"/>
+          </a:xfrm>
+          <a:prstGeom prst="rect">
+            <a:avLst/>
+          </a:prstGeom>
+        </p:spPr>
+      </p:pic>
+      <p:pic>
+        <p:nvPicPr>
+          <p:cNvPr id="18" name="Picture 17"/>
+          <p:cNvPicPr>
+            <a:picLocks noChangeAspect="1"/>
+          </p:cNvPicPr>
+          <p:nvPr/>
+        </p:nvPicPr>
+        <p:blipFill>
+          <a:blip r:embed="rId17" cstate="print">
+            <a:extLst>
+              <a:ext uri="{28A0092B-C50C-407E-A947-70E740481C1C}">
+                <a14:useLocalDpi xmlns:a14="http://schemas.microsoft.com/office/drawing/2010/main" val="0"/>
+              </a:ext>
+            </a:extLst>
+          </a:blip>
+          <a:stretch>
+            <a:fillRect/>
+          </a:stretch>
+        </p:blipFill>
+        <p:spPr>
+          <a:xfrm>
+            <a:off x="4920960" y="3777960"/>
+            <a:ext cx="1402080" cy="1402080"/>
+          </a:xfrm>
+          <a:prstGeom prst="rect">
+            <a:avLst/>
+          </a:prstGeom>
+        </p:spPr>
+      </p:pic>
+      <p:pic>
+        <p:nvPicPr>
+          <p:cNvPr id="19" name="Picture 18"/>
+          <p:cNvPicPr>
+            <a:picLocks noChangeAspect="1"/>
+          </p:cNvPicPr>
+          <p:nvPr/>
+        </p:nvPicPr>
+        <p:blipFill>
+          <a:blip r:embed="rId18" cstate="print">
+            <a:extLst>
+              <a:ext uri="{28A0092B-C50C-407E-A947-70E740481C1C}">
+                <a14:useLocalDpi xmlns:a14="http://schemas.microsoft.com/office/drawing/2010/main" val="0"/>
+              </a:ext>
+            </a:extLst>
+          </a:blip>
+          <a:stretch>
+            <a:fillRect/>
+          </a:stretch>
+        </p:blipFill>
+        <p:spPr>
+          <a:xfrm>
+            <a:off x="5070960" y="3927960"/>
+            <a:ext cx="1402080" cy="1402080"/>
+          </a:xfrm>
+          <a:prstGeom prst="rect">
+            <a:avLst/>
+          </a:prstGeom>
+        </p:spPr>
+      </p:pic>
+      <p:pic>
+        <p:nvPicPr>
+          <p:cNvPr id="20" name="Picture 19"/>
+          <p:cNvPicPr>
+            <a:picLocks noChangeAspect="1"/>
+          </p:cNvPicPr>
+          <p:nvPr/>
+        </p:nvPicPr>
+        <p:blipFill>
+          <a:blip r:embed="rId19" cstate="print">
+            <a:extLst>
+              <a:ext uri="{28A0092B-C50C-407E-A947-70E740481C1C}">
+                <a14:useLocalDpi xmlns:a14="http://schemas.microsoft.com/office/drawing/2010/main" val="0"/>
+              </a:ext>
+            </a:extLst>
+          </a:blip>
+          <a:stretch>
+            <a:fillRect/>
+          </a:stretch>
+        </p:blipFill>
+        <p:spPr>
+          <a:xfrm>
+            <a:off x="5220960" y="4077960"/>
+            <a:ext cx="1402080" cy="1402080"/>
+          </a:xfrm>
+          <a:prstGeom prst="rect">
+            <a:avLst/>
+          </a:prstGeom>
+        </p:spPr>
+      </p:pic>
+      <p:pic>
+        <p:nvPicPr>
+          <p:cNvPr id="24" name="Picture 23"/>
+          <p:cNvPicPr>
+            <a:picLocks noChangeAspect="1"/>
+          </p:cNvPicPr>
+          <p:nvPr/>
+        </p:nvPicPr>
+        <p:blipFill>
+          <a:blip r:embed="rId20" cstate="print">
+            <a:extLst>
+              <a:ext uri="{28A0092B-C50C-407E-A947-70E740481C1C}">
+                <a14:useLocalDpi xmlns:a14="http://schemas.microsoft.com/office/drawing/2010/main" val="0"/>
+              </a:ext>
+            </a:extLst>
+          </a:blip>
+          <a:stretch>
+            <a:fillRect/>
+          </a:stretch>
+        </p:blipFill>
+        <p:spPr>
+          <a:xfrm>
+            <a:off x="5370960" y="4227960"/>
+            <a:ext cx="1402080" cy="1402080"/>
+          </a:xfrm>
+          <a:prstGeom prst="rect">
+            <a:avLst/>
+          </a:prstGeom>
+        </p:spPr>
+      </p:pic>
+      <p:pic>
+        <p:nvPicPr>
+          <p:cNvPr id="26" name="Picture 25"/>
+          <p:cNvPicPr>
+            <a:picLocks noChangeAspect="1"/>
+          </p:cNvPicPr>
+          <p:nvPr/>
+        </p:nvPicPr>
+        <p:blipFill>
+          <a:blip r:embed="rId21" cstate="print">
+            <a:extLst>
+              <a:ext uri="{28A0092B-C50C-407E-A947-70E740481C1C}">
+                <a14:useLocalDpi xmlns:a14="http://schemas.microsoft.com/office/drawing/2010/main" val="0"/>
+              </a:ext>
+            </a:extLst>
+          </a:blip>
+          <a:stretch>
+            <a:fillRect/>
+          </a:stretch>
+        </p:blipFill>
+        <p:spPr>
+          <a:xfrm>
+            <a:off x="5520960" y="4377960"/>
+            <a:ext cx="1402080" cy="1402080"/>
+          </a:xfrm>
+          <a:prstGeom prst="rect">
+            <a:avLst/>
+          </a:prstGeom>
+        </p:spPr>
+      </p:pic>
+      <p:pic>
+        <p:nvPicPr>
+          <p:cNvPr id="27" name="Picture 26"/>
+          <p:cNvPicPr>
+            <a:picLocks noChangeAspect="1"/>
+          </p:cNvPicPr>
+          <p:nvPr/>
+        </p:nvPicPr>
+        <p:blipFill>
+          <a:blip r:embed="rId22" cstate="print">
+            <a:extLst>
+              <a:ext uri="{28A0092B-C50C-407E-A947-70E740481C1C}">
+                <a14:useLocalDpi xmlns:a14="http://schemas.microsoft.com/office/drawing/2010/main" val="0"/>
+              </a:ext>
+            </a:extLst>
+          </a:blip>
+          <a:stretch>
+            <a:fillRect/>
+          </a:stretch>
+        </p:blipFill>
+        <p:spPr>
+          <a:xfrm>
+            <a:off x="5670960" y="4527960"/>
+            <a:ext cx="1402080" cy="1402080"/>
+          </a:xfrm>
+          <a:prstGeom prst="rect">
+            <a:avLst/>
+          </a:prstGeom>
+        </p:spPr>
+      </p:pic>
+      <p:pic>
+        <p:nvPicPr>
+          <p:cNvPr id="36" name="Picture 35"/>
+          <p:cNvPicPr>
+            <a:picLocks noChangeAspect="1"/>
+          </p:cNvPicPr>
+          <p:nvPr/>
+        </p:nvPicPr>
+        <p:blipFill>
+          <a:blip r:embed="rId23" cstate="print">
+            <a:extLst>
+              <a:ext uri="{28A0092B-C50C-407E-A947-70E740481C1C}">
+                <a14:useLocalDpi xmlns:a14="http://schemas.microsoft.com/office/drawing/2010/main" val="0"/>
+              </a:ext>
+            </a:extLst>
+          </a:blip>
+          <a:stretch>
+            <a:fillRect/>
+          </a:stretch>
+        </p:blipFill>
+        <p:spPr>
+          <a:xfrm>
+            <a:off x="5820960" y="4677960"/>
+            <a:ext cx="1402080" cy="1402080"/>
+          </a:xfrm>
+          <a:prstGeom prst="rect">
+            <a:avLst/>
+          </a:prstGeom>
+        </p:spPr>
+      </p:pic>
+      <p:pic>
+        <p:nvPicPr>
+          <p:cNvPr id="37" name="Picture 36"/>
+          <p:cNvPicPr>
+            <a:picLocks noChangeAspect="1"/>
+          </p:cNvPicPr>
+          <p:nvPr/>
+        </p:nvPicPr>
+        <p:blipFill>
+          <a:blip r:embed="rId24" cstate="print">
+            <a:extLst>
+              <a:ext uri="{28A0092B-C50C-407E-A947-70E740481C1C}">
+                <a14:useLocalDpi xmlns:a14="http://schemas.microsoft.com/office/drawing/2010/main" val="0"/>
+              </a:ext>
+            </a:extLst>
+          </a:blip>
+          <a:stretch>
+            <a:fillRect/>
+          </a:stretch>
+        </p:blipFill>
+        <p:spPr>
+          <a:xfrm>
+            <a:off x="5970960" y="4827960"/>
+            <a:ext cx="1402080" cy="1402080"/>
+          </a:xfrm>
+          <a:prstGeom prst="rect">
+            <a:avLst/>
+          </a:prstGeom>
+        </p:spPr>
+      </p:pic>
+      <p:pic>
+        <p:nvPicPr>
+          <p:cNvPr id="38" name="Picture 37"/>
+          <p:cNvPicPr>
+            <a:picLocks noChangeAspect="1"/>
+          </p:cNvPicPr>
+          <p:nvPr/>
+        </p:nvPicPr>
+        <p:blipFill>
+          <a:blip r:embed="rId25" cstate="print">
+            <a:extLst>
+              <a:ext uri="{28A0092B-C50C-407E-A947-70E740481C1C}">
+                <a14:useLocalDpi xmlns:a14="http://schemas.microsoft.com/office/drawing/2010/main" val="0"/>
+              </a:ext>
+            </a:extLst>
+          </a:blip>
+          <a:stretch>
+            <a:fillRect/>
+          </a:stretch>
+        </p:blipFill>
+        <p:spPr>
+          <a:xfrm>
+            <a:off x="6120960" y="4977960"/>
+            <a:ext cx="1402080" cy="1402080"/>
+          </a:xfrm>
+          <a:prstGeom prst="rect">
+            <a:avLst/>
+          </a:prstGeom>
+        </p:spPr>
+      </p:pic>
+      <p:pic>
+        <p:nvPicPr>
+          <p:cNvPr id="39" name="Picture 38"/>
+          <p:cNvPicPr>
+            <a:picLocks noChangeAspect="1"/>
+          </p:cNvPicPr>
+          <p:nvPr/>
+        </p:nvPicPr>
+        <p:blipFill>
+          <a:blip r:embed="rId26" cstate="print">
+            <a:extLst>
+              <a:ext uri="{28A0092B-C50C-407E-A947-70E740481C1C}">
+                <a14:useLocalDpi xmlns:a14="http://schemas.microsoft.com/office/drawing/2010/main" val="0"/>
+              </a:ext>
+            </a:extLst>
+          </a:blip>
+          <a:stretch>
+            <a:fillRect/>
+          </a:stretch>
+        </p:blipFill>
+        <p:spPr>
+          <a:xfrm>
+            <a:off x="6270960" y="5127960"/>
+            <a:ext cx="1402080" cy="1402080"/>
+          </a:xfrm>
+          <a:prstGeom prst="rect">
+            <a:avLst/>
+          </a:prstGeom>
+        </p:spPr>
+      </p:pic>
+      <p:pic>
+        <p:nvPicPr>
+          <p:cNvPr id="40" name="Picture 39"/>
+          <p:cNvPicPr>
+            <a:picLocks noChangeAspect="1"/>
+          </p:cNvPicPr>
+          <p:nvPr/>
+        </p:nvPicPr>
+        <p:blipFill>
+          <a:blip r:embed="rId27" cstate="print">
+            <a:extLst>
+              <a:ext uri="{28A0092B-C50C-407E-A947-70E740481C1C}">
+                <a14:useLocalDpi xmlns:a14="http://schemas.microsoft.com/office/drawing/2010/main" val="0"/>
+              </a:ext>
+            </a:extLst>
+          </a:blip>
+          <a:stretch>
+            <a:fillRect/>
+          </a:stretch>
+        </p:blipFill>
+        <p:spPr>
+          <a:xfrm>
+            <a:off x="6420960" y="5277960"/>
+            <a:ext cx="1402080" cy="1402080"/>
+          </a:xfrm>
+          <a:prstGeom prst="rect">
+            <a:avLst/>
+          </a:prstGeom>
+        </p:spPr>
+      </p:pic>
+      <p:pic>
+        <p:nvPicPr>
+          <p:cNvPr id="41" name="Picture 40"/>
+          <p:cNvPicPr>
+            <a:picLocks noChangeAspect="1"/>
+          </p:cNvPicPr>
+          <p:nvPr/>
+        </p:nvPicPr>
+        <p:blipFill>
+          <a:blip r:embed="rId28" cstate="print">
+            <a:extLst>
+              <a:ext uri="{28A0092B-C50C-407E-A947-70E740481C1C}">
+                <a14:useLocalDpi xmlns:a14="http://schemas.microsoft.com/office/drawing/2010/main" val="0"/>
+              </a:ext>
+            </a:extLst>
+          </a:blip>
+          <a:stretch>
+            <a:fillRect/>
+          </a:stretch>
+        </p:blipFill>
+        <p:spPr>
+          <a:xfrm>
+            <a:off x="6570960" y="5427960"/>
+            <a:ext cx="1402080" cy="1402080"/>
+          </a:xfrm>
+          <a:prstGeom prst="rect">
+            <a:avLst/>
+          </a:prstGeom>
+        </p:spPr>
+      </p:pic>
+      <p:pic>
+        <p:nvPicPr>
+          <p:cNvPr id="42" name="Picture 41"/>
+          <p:cNvPicPr>
+            <a:picLocks noChangeAspect="1"/>
+          </p:cNvPicPr>
+          <p:nvPr/>
+        </p:nvPicPr>
+        <p:blipFill>
+          <a:blip r:embed="rId29" cstate="print">
+            <a:extLst>
+              <a:ext uri="{28A0092B-C50C-407E-A947-70E740481C1C}">
+                <a14:useLocalDpi xmlns:a14="http://schemas.microsoft.com/office/drawing/2010/main" val="0"/>
+              </a:ext>
+            </a:extLst>
+          </a:blip>
+          <a:stretch>
+            <a:fillRect/>
+          </a:stretch>
+        </p:blipFill>
+        <p:spPr>
+          <a:xfrm>
+            <a:off x="6720960" y="5577960"/>
+            <a:ext cx="1402080" cy="1402080"/>
+          </a:xfrm>
+          <a:prstGeom prst="rect">
+            <a:avLst/>
+          </a:prstGeom>
+        </p:spPr>
+      </p:pic>
+      <p:pic>
+        <p:nvPicPr>
+          <p:cNvPr id="43" name="Picture 42"/>
+          <p:cNvPicPr>
+            <a:picLocks noChangeAspect="1"/>
+          </p:cNvPicPr>
+          <p:nvPr/>
+        </p:nvPicPr>
+        <p:blipFill>
+          <a:blip r:embed="rId30" cstate="print">
+            <a:extLst>
+              <a:ext uri="{28A0092B-C50C-407E-A947-70E740481C1C}">
+                <a14:useLocalDpi xmlns:a14="http://schemas.microsoft.com/office/drawing/2010/main" val="0"/>
+              </a:ext>
+            </a:extLst>
+          </a:blip>
+          <a:stretch>
+            <a:fillRect/>
+          </a:stretch>
+        </p:blipFill>
+        <p:spPr>
+          <a:xfrm>
+            <a:off x="6870960" y="5727960"/>
+            <a:ext cx="1402080" cy="1402080"/>
+          </a:xfrm>
+          <a:prstGeom prst="rect">
+            <a:avLst/>
+          </a:prstGeom>
+        </p:spPr>
+      </p:pic>
+      <p:pic>
+        <p:nvPicPr>
+          <p:cNvPr id="44" name="Picture 43"/>
+          <p:cNvPicPr>
+            <a:picLocks noChangeAspect="1"/>
+          </p:cNvPicPr>
+          <p:nvPr/>
+        </p:nvPicPr>
+        <p:blipFill>
+          <a:blip r:embed="rId31" cstate="print">
+            <a:extLst>
+              <a:ext uri="{28A0092B-C50C-407E-A947-70E740481C1C}">
+                <a14:useLocalDpi xmlns:a14="http://schemas.microsoft.com/office/drawing/2010/main" val="0"/>
+              </a:ext>
+            </a:extLst>
+          </a:blip>
+          <a:stretch>
+            <a:fillRect/>
+          </a:stretch>
+        </p:blipFill>
+        <p:spPr>
+          <a:xfrm>
+            <a:off x="7020960" y="5877960"/>
+            <a:ext cx="1402080" cy="1402080"/>
+          </a:xfrm>
+          <a:prstGeom prst="rect">
+            <a:avLst/>
+          </a:prstGeom>
+        </p:spPr>
+      </p:pic>
+      <p:pic>
+        <p:nvPicPr>
+          <p:cNvPr id="45" name="Picture 44"/>
+          <p:cNvPicPr>
+            <a:picLocks noChangeAspect="1"/>
+          </p:cNvPicPr>
+          <p:nvPr/>
+        </p:nvPicPr>
+        <p:blipFill>
+          <a:blip r:embed="rId32" cstate="print">
+            <a:extLst>
+              <a:ext uri="{28A0092B-C50C-407E-A947-70E740481C1C}">
+                <a14:useLocalDpi xmlns:a14="http://schemas.microsoft.com/office/drawing/2010/main" val="0"/>
+              </a:ext>
+            </a:extLst>
+          </a:blip>
+          <a:stretch>
+            <a:fillRect/>
+          </a:stretch>
+        </p:blipFill>
+        <p:spPr>
+          <a:xfrm>
+            <a:off x="7170960" y="6027960"/>
+            <a:ext cx="1402080" cy="1402080"/>
+          </a:xfrm>
+          <a:prstGeom prst="rect">
+            <a:avLst/>
+          </a:prstGeom>
+        </p:spPr>
+      </p:pic>
+      <p:pic>
+        <p:nvPicPr>
+          <p:cNvPr id="46" name="Picture 45"/>
+          <p:cNvPicPr>
+            <a:picLocks noChangeAspect="1"/>
+          </p:cNvPicPr>
+          <p:nvPr/>
+        </p:nvPicPr>
+        <p:blipFill>
+          <a:blip r:embed="rId33" cstate="print">
+            <a:extLst>
+              <a:ext uri="{28A0092B-C50C-407E-A947-70E740481C1C}">
+                <a14:useLocalDpi xmlns:a14="http://schemas.microsoft.com/office/drawing/2010/main" val="0"/>
+              </a:ext>
+            </a:extLst>
+          </a:blip>
+          <a:stretch>
+            <a:fillRect/>
+          </a:stretch>
+        </p:blipFill>
+        <p:spPr>
+          <a:xfrm>
+            <a:off x="7320960" y="6177960"/>
+            <a:ext cx="1402080" cy="1402080"/>
+          </a:xfrm>
+          <a:prstGeom prst="rect">
+            <a:avLst/>
+          </a:prstGeom>
+        </p:spPr>
+      </p:pic>
+      <p:pic>
+        <p:nvPicPr>
+          <p:cNvPr id="47" name="Picture 46"/>
+          <p:cNvPicPr>
+            <a:picLocks noChangeAspect="1"/>
+          </p:cNvPicPr>
+          <p:nvPr/>
+        </p:nvPicPr>
+        <p:blipFill>
+          <a:blip r:embed="rId34" cstate="print">
+            <a:extLst>
+              <a:ext uri="{28A0092B-C50C-407E-A947-70E740481C1C}">
+                <a14:useLocalDpi xmlns:a14="http://schemas.microsoft.com/office/drawing/2010/main" val="0"/>
+              </a:ext>
+            </a:extLst>
+          </a:blip>
+          <a:stretch>
+            <a:fillRect/>
+          </a:stretch>
+        </p:blipFill>
+        <p:spPr>
+          <a:xfrm>
+            <a:off x="7470960" y="6327960"/>
+            <a:ext cx="1402080" cy="1402080"/>
+          </a:xfrm>
+          <a:prstGeom prst="rect">
+            <a:avLst/>
+          </a:prstGeom>
+        </p:spPr>
+      </p:pic>
+      <p:pic>
+        <p:nvPicPr>
+          <p:cNvPr id="48" name="Picture 47"/>
+          <p:cNvPicPr>
+            <a:picLocks noChangeAspect="1"/>
+          </p:cNvPicPr>
+          <p:nvPr/>
+        </p:nvPicPr>
+        <p:blipFill>
+          <a:blip r:embed="rId35" cstate="print">
+            <a:extLst>
+              <a:ext uri="{28A0092B-C50C-407E-A947-70E740481C1C}">
+                <a14:useLocalDpi xmlns:a14="http://schemas.microsoft.com/office/drawing/2010/main" val="0"/>
+              </a:ext>
+            </a:extLst>
+          </a:blip>
+          <a:stretch>
+            <a:fillRect/>
+          </a:stretch>
+        </p:blipFill>
+        <p:spPr>
+          <a:xfrm>
+            <a:off x="7620960" y="6477960"/>
+            <a:ext cx="1402080" cy="1402080"/>
+          </a:xfrm>
+          <a:prstGeom prst="rect">
+            <a:avLst/>
+          </a:prstGeom>
+        </p:spPr>
+      </p:pic>
+      <p:pic>
+        <p:nvPicPr>
+          <p:cNvPr id="49" name="Picture 48"/>
+          <p:cNvPicPr>
+            <a:picLocks noChangeAspect="1"/>
+          </p:cNvPicPr>
+          <p:nvPr/>
+        </p:nvPicPr>
+        <p:blipFill>
+          <a:blip r:embed="rId36" cstate="print">
+            <a:extLst>
+              <a:ext uri="{28A0092B-C50C-407E-A947-70E740481C1C}">
+                <a14:useLocalDpi xmlns:a14="http://schemas.microsoft.com/office/drawing/2010/main" val="0"/>
+              </a:ext>
+            </a:extLst>
+          </a:blip>
+          <a:stretch>
+            <a:fillRect/>
+          </a:stretch>
+        </p:blipFill>
+        <p:spPr>
+          <a:xfrm>
+            <a:off x="7770960" y="6627960"/>
+            <a:ext cx="1402080" cy="1402080"/>
+          </a:xfrm>
+          <a:prstGeom prst="rect">
+            <a:avLst/>
+          </a:prstGeom>
+        </p:spPr>
+      </p:pic>
+      <p:pic>
+        <p:nvPicPr>
+          <p:cNvPr id="50" name="Picture 49"/>
+          <p:cNvPicPr>
+            <a:picLocks noChangeAspect="1"/>
+          </p:cNvPicPr>
+          <p:nvPr/>
+        </p:nvPicPr>
+        <p:blipFill>
+          <a:blip r:embed="rId37" cstate="print">
+            <a:extLst>
+              <a:ext uri="{28A0092B-C50C-407E-A947-70E740481C1C}">
+                <a14:useLocalDpi xmlns:a14="http://schemas.microsoft.com/office/drawing/2010/main" val="0"/>
+              </a:ext>
+            </a:extLst>
+          </a:blip>
+          <a:stretch>
+            <a:fillRect/>
+          </a:stretch>
+        </p:blipFill>
+        <p:spPr>
+          <a:xfrm>
+            <a:off x="7920960" y="6777960"/>
+            <a:ext cx="1402080" cy="1402080"/>
+          </a:xfrm>
+          <a:prstGeom prst="rect">
+            <a:avLst/>
+          </a:prstGeom>
+        </p:spPr>
+      </p:pic>
+      <p:pic>
+        <p:nvPicPr>
+          <p:cNvPr id="51" name="Picture 50"/>
+          <p:cNvPicPr>
+            <a:picLocks noChangeAspect="1"/>
+          </p:cNvPicPr>
+          <p:nvPr/>
+        </p:nvPicPr>
+        <p:blipFill>
+          <a:blip r:embed="rId38" cstate="print">
+            <a:extLst>
+              <a:ext uri="{28A0092B-C50C-407E-A947-70E740481C1C}">
+                <a14:useLocalDpi xmlns:a14="http://schemas.microsoft.com/office/drawing/2010/main" val="0"/>
+              </a:ext>
+            </a:extLst>
+          </a:blip>
+          <a:stretch>
+            <a:fillRect/>
+          </a:stretch>
+        </p:blipFill>
+        <p:spPr>
+          <a:xfrm>
+            <a:off x="8070960" y="6927960"/>
+            <a:ext cx="1402080" cy="1402080"/>
+          </a:xfrm>
+          <a:prstGeom prst="rect">
+            <a:avLst/>
+          </a:prstGeom>
+        </p:spPr>
+      </p:pic>
+      <p:pic>
+        <p:nvPicPr>
+          <p:cNvPr id="52" name="Picture 51"/>
+          <p:cNvPicPr>
+            <a:picLocks noChangeAspect="1"/>
+          </p:cNvPicPr>
+          <p:nvPr/>
+        </p:nvPicPr>
+        <p:blipFill>
+          <a:blip r:embed="rId39" cstate="print">
+            <a:extLst>
+              <a:ext uri="{28A0092B-C50C-407E-A947-70E740481C1C}">
+                <a14:useLocalDpi xmlns:a14="http://schemas.microsoft.com/office/drawing/2010/main" val="0"/>
+              </a:ext>
+            </a:extLst>
+          </a:blip>
+          <a:stretch>
+            <a:fillRect/>
+          </a:stretch>
+        </p:blipFill>
+        <p:spPr>
+          <a:xfrm>
+            <a:off x="8220960" y="7077960"/>
+            <a:ext cx="1402080" cy="1402080"/>
+          </a:xfrm>
+          <a:prstGeom prst="rect">
+            <a:avLst/>
+          </a:prstGeom>
+        </p:spPr>
+      </p:pic>
+      <p:pic>
+        <p:nvPicPr>
+          <p:cNvPr id="53" name="Picture 52"/>
+          <p:cNvPicPr>
+            <a:picLocks noChangeAspect="1"/>
+          </p:cNvPicPr>
+          <p:nvPr/>
+        </p:nvPicPr>
+        <p:blipFill>
+          <a:blip r:embed="rId40" cstate="print">
+            <a:extLst>
+              <a:ext uri="{28A0092B-C50C-407E-A947-70E740481C1C}">
+                <a14:useLocalDpi xmlns:a14="http://schemas.microsoft.com/office/drawing/2010/main" val="0"/>
+              </a:ext>
+            </a:extLst>
+          </a:blip>
+          <a:stretch>
+            <a:fillRect/>
+          </a:stretch>
+        </p:blipFill>
+        <p:spPr>
+          <a:xfrm>
+            <a:off x="8370960" y="7227960"/>
+            <a:ext cx="1402080" cy="1402080"/>
+          </a:xfrm>
+          <a:prstGeom prst="rect">
+            <a:avLst/>
+          </a:prstGeom>
+        </p:spPr>
+      </p:pic>
+      <p:pic>
+        <p:nvPicPr>
+          <p:cNvPr id="54" name="Picture 53"/>
+          <p:cNvPicPr>
+            <a:picLocks noChangeAspect="1"/>
+          </p:cNvPicPr>
+          <p:nvPr/>
+        </p:nvPicPr>
+        <p:blipFill>
+          <a:blip r:embed="rId41" cstate="print">
+            <a:extLst>
+              <a:ext uri="{28A0092B-C50C-407E-A947-70E740481C1C}">
+                <a14:useLocalDpi xmlns:a14="http://schemas.microsoft.com/office/drawing/2010/main" val="0"/>
+              </a:ext>
+            </a:extLst>
+          </a:blip>
+          <a:stretch>
+            <a:fillRect/>
+          </a:stretch>
+        </p:blipFill>
+        <p:spPr>
+          <a:xfrm>
+            <a:off x="8520960" y="7377960"/>
+            <a:ext cx="1402080" cy="1402080"/>
+          </a:xfrm>
+          <a:prstGeom prst="rect">
+            <a:avLst/>
+          </a:prstGeom>
+        </p:spPr>
+      </p:pic>
+      <p:pic>
+        <p:nvPicPr>
+          <p:cNvPr id="55" name="Picture 54"/>
+          <p:cNvPicPr>
+            <a:picLocks noChangeAspect="1"/>
+          </p:cNvPicPr>
+          <p:nvPr/>
+        </p:nvPicPr>
+        <p:blipFill>
+          <a:blip r:embed="rId42" cstate="print">
+            <a:extLst>
+              <a:ext uri="{28A0092B-C50C-407E-A947-70E740481C1C}">
+                <a14:useLocalDpi xmlns:a14="http://schemas.microsoft.com/office/drawing/2010/main" val="0"/>
+              </a:ext>
+            </a:extLst>
+          </a:blip>
+          <a:stretch>
+            <a:fillRect/>
+          </a:stretch>
+        </p:blipFill>
+        <p:spPr>
+          <a:xfrm>
+            <a:off x="8670960" y="7527960"/>
+            <a:ext cx="1402080" cy="1402080"/>
+          </a:xfrm>
+          <a:prstGeom prst="rect">
+            <a:avLst/>
+          </a:prstGeom>
+        </p:spPr>
+      </p:pic>
+      <p:pic>
+        <p:nvPicPr>
+          <p:cNvPr id="56" name="Picture 55"/>
+          <p:cNvPicPr>
+            <a:picLocks noChangeAspect="1"/>
+          </p:cNvPicPr>
+          <p:nvPr/>
+        </p:nvPicPr>
+        <p:blipFill>
+          <a:blip r:embed="rId43" cstate="print">
+            <a:extLst>
+              <a:ext uri="{28A0092B-C50C-407E-A947-70E740481C1C}">
+                <a14:useLocalDpi xmlns:a14="http://schemas.microsoft.com/office/drawing/2010/main" val="0"/>
+              </a:ext>
+            </a:extLst>
+          </a:blip>
+          <a:stretch>
+            <a:fillRect/>
+          </a:stretch>
+        </p:blipFill>
+        <p:spPr>
+          <a:xfrm>
+            <a:off x="2821965" y="1445599"/>
+            <a:ext cx="1402080" cy="1402080"/>
+          </a:xfrm>
+          <a:prstGeom prst="rect">
+            <a:avLst/>
+          </a:prstGeom>
+          <a:effectLst>
+            <a:softEdge rad="127000"/>
+          </a:effectLst>
+        </p:spPr>
+      </p:pic>
     </p:spTree>
     <p:extLst>
       <p:ext uri="{BB962C8B-B14F-4D97-AF65-F5344CB8AC3E}">

</xml_diff>

<commit_message>
Achievements images. Sorry for the big push
</commit_message>
<xml_diff>
--- a/docs/Mockups/First Draft/Draft Achievements Mockup.pptx
+++ b/docs/Mockups/First Draft/Draft Achievements Mockup.pptx
@@ -4892,14 +4892,14 @@
       </p:sp>
       <p:pic>
         <p:nvPicPr>
-          <p:cNvPr id="11" name="Picture 10"/>
+          <p:cNvPr id="12" name="Picture 11"/>
           <p:cNvPicPr>
             <a:picLocks noChangeAspect="1"/>
           </p:cNvPicPr>
           <p:nvPr/>
         </p:nvPicPr>
         <p:blipFill>
-          <a:blip r:embed="rId12" cstate="print">
+          <a:blip r:embed="rId12">
             <a:extLst>
               <a:ext uri="{28A0092B-C50C-407E-A947-70E740481C1C}">
                 <a14:useLocalDpi xmlns:a14="http://schemas.microsoft.com/office/drawing/2010/main" val="0"/>
@@ -4912,8 +4912,8 @@
         </p:blipFill>
         <p:spPr>
           <a:xfrm>
-            <a:off x="4170960" y="3027960"/>
-            <a:ext cx="1402080" cy="1402080"/>
+            <a:off x="-3143372" y="3823496"/>
+            <a:ext cx="3505504" cy="3505504"/>
           </a:xfrm>
           <a:prstGeom prst="rect">
             <a:avLst/>
@@ -4922,14 +4922,14 @@
       </p:pic>
       <p:pic>
         <p:nvPicPr>
-          <p:cNvPr id="12" name="Picture 11"/>
+          <p:cNvPr id="14" name="Picture 13"/>
           <p:cNvPicPr>
             <a:picLocks noChangeAspect="1"/>
           </p:cNvPicPr>
           <p:nvPr/>
         </p:nvPicPr>
         <p:blipFill>
-          <a:blip r:embed="rId13">
+          <a:blip r:embed="rId13" cstate="print">
             <a:extLst>
               <a:ext uri="{28A0092B-C50C-407E-A947-70E740481C1C}">
                 <a14:useLocalDpi xmlns:a14="http://schemas.microsoft.com/office/drawing/2010/main" val="0"/>
@@ -4942,8 +4942,8 @@
         </p:blipFill>
         <p:spPr>
           <a:xfrm>
-            <a:off x="-3143372" y="3823496"/>
-            <a:ext cx="3505504" cy="3505504"/>
+            <a:off x="4470960" y="3327960"/>
+            <a:ext cx="1402080" cy="1402080"/>
           </a:xfrm>
           <a:prstGeom prst="rect">
             <a:avLst/>
@@ -4952,7 +4952,7 @@
       </p:pic>
       <p:pic>
         <p:nvPicPr>
-          <p:cNvPr id="14" name="Picture 13"/>
+          <p:cNvPr id="15" name="Picture 14"/>
           <p:cNvPicPr>
             <a:picLocks noChangeAspect="1"/>
           </p:cNvPicPr>
@@ -4972,7 +4972,7 @@
         </p:blipFill>
         <p:spPr>
           <a:xfrm>
-            <a:off x="4470960" y="3327960"/>
+            <a:off x="4620960" y="3477960"/>
             <a:ext cx="1402080" cy="1402080"/>
           </a:xfrm>
           <a:prstGeom prst="rect">
@@ -4982,7 +4982,7 @@
       </p:pic>
       <p:pic>
         <p:nvPicPr>
-          <p:cNvPr id="15" name="Picture 14"/>
+          <p:cNvPr id="16" name="Picture 15"/>
           <p:cNvPicPr>
             <a:picLocks noChangeAspect="1"/>
           </p:cNvPicPr>
@@ -5002,7 +5002,7 @@
         </p:blipFill>
         <p:spPr>
           <a:xfrm>
-            <a:off x="4620960" y="3477960"/>
+            <a:off x="4770960" y="3627960"/>
             <a:ext cx="1402080" cy="1402080"/>
           </a:xfrm>
           <a:prstGeom prst="rect">
@@ -5012,7 +5012,7 @@
       </p:pic>
       <p:pic>
         <p:nvPicPr>
-          <p:cNvPr id="16" name="Picture 15"/>
+          <p:cNvPr id="18" name="Picture 17"/>
           <p:cNvPicPr>
             <a:picLocks noChangeAspect="1"/>
           </p:cNvPicPr>
@@ -5032,7 +5032,7 @@
         </p:blipFill>
         <p:spPr>
           <a:xfrm>
-            <a:off x="4770960" y="3627960"/>
+            <a:off x="4920960" y="3777960"/>
             <a:ext cx="1402080" cy="1402080"/>
           </a:xfrm>
           <a:prstGeom prst="rect">
@@ -5042,7 +5042,7 @@
       </p:pic>
       <p:pic>
         <p:nvPicPr>
-          <p:cNvPr id="18" name="Picture 17"/>
+          <p:cNvPr id="19" name="Picture 18"/>
           <p:cNvPicPr>
             <a:picLocks noChangeAspect="1"/>
           </p:cNvPicPr>
@@ -5062,7 +5062,7 @@
         </p:blipFill>
         <p:spPr>
           <a:xfrm>
-            <a:off x="4920960" y="3777960"/>
+            <a:off x="5070960" y="3927960"/>
             <a:ext cx="1402080" cy="1402080"/>
           </a:xfrm>
           <a:prstGeom prst="rect">
@@ -5072,7 +5072,7 @@
       </p:pic>
       <p:pic>
         <p:nvPicPr>
-          <p:cNvPr id="19" name="Picture 18"/>
+          <p:cNvPr id="20" name="Picture 19"/>
           <p:cNvPicPr>
             <a:picLocks noChangeAspect="1"/>
           </p:cNvPicPr>
@@ -5092,7 +5092,7 @@
         </p:blipFill>
         <p:spPr>
           <a:xfrm>
-            <a:off x="5070960" y="3927960"/>
+            <a:off x="5220960" y="4077960"/>
             <a:ext cx="1402080" cy="1402080"/>
           </a:xfrm>
           <a:prstGeom prst="rect">
@@ -5102,7 +5102,7 @@
       </p:pic>
       <p:pic>
         <p:nvPicPr>
-          <p:cNvPr id="20" name="Picture 19"/>
+          <p:cNvPr id="24" name="Picture 23"/>
           <p:cNvPicPr>
             <a:picLocks noChangeAspect="1"/>
           </p:cNvPicPr>
@@ -5122,7 +5122,7 @@
         </p:blipFill>
         <p:spPr>
           <a:xfrm>
-            <a:off x="5220960" y="4077960"/>
+            <a:off x="5370960" y="4227960"/>
             <a:ext cx="1402080" cy="1402080"/>
           </a:xfrm>
           <a:prstGeom prst="rect">
@@ -5132,7 +5132,7 @@
       </p:pic>
       <p:pic>
         <p:nvPicPr>
-          <p:cNvPr id="24" name="Picture 23"/>
+          <p:cNvPr id="26" name="Picture 25"/>
           <p:cNvPicPr>
             <a:picLocks noChangeAspect="1"/>
           </p:cNvPicPr>
@@ -5152,7 +5152,7 @@
         </p:blipFill>
         <p:spPr>
           <a:xfrm>
-            <a:off x="5370960" y="4227960"/>
+            <a:off x="5520960" y="4377960"/>
             <a:ext cx="1402080" cy="1402080"/>
           </a:xfrm>
           <a:prstGeom prst="rect">
@@ -5162,7 +5162,7 @@
       </p:pic>
       <p:pic>
         <p:nvPicPr>
-          <p:cNvPr id="26" name="Picture 25"/>
+          <p:cNvPr id="27" name="Picture 26"/>
           <p:cNvPicPr>
             <a:picLocks noChangeAspect="1"/>
           </p:cNvPicPr>
@@ -5182,7 +5182,7 @@
         </p:blipFill>
         <p:spPr>
           <a:xfrm>
-            <a:off x="5520960" y="4377960"/>
+            <a:off x="5670960" y="4527960"/>
             <a:ext cx="1402080" cy="1402080"/>
           </a:xfrm>
           <a:prstGeom prst="rect">
@@ -5192,7 +5192,7 @@
       </p:pic>
       <p:pic>
         <p:nvPicPr>
-          <p:cNvPr id="27" name="Picture 26"/>
+          <p:cNvPr id="36" name="Picture 35"/>
           <p:cNvPicPr>
             <a:picLocks noChangeAspect="1"/>
           </p:cNvPicPr>
@@ -5212,7 +5212,7 @@
         </p:blipFill>
         <p:spPr>
           <a:xfrm>
-            <a:off x="5670960" y="4527960"/>
+            <a:off x="5820960" y="4677960"/>
             <a:ext cx="1402080" cy="1402080"/>
           </a:xfrm>
           <a:prstGeom prst="rect">
@@ -5222,7 +5222,7 @@
       </p:pic>
       <p:pic>
         <p:nvPicPr>
-          <p:cNvPr id="36" name="Picture 35"/>
+          <p:cNvPr id="37" name="Picture 36"/>
           <p:cNvPicPr>
             <a:picLocks noChangeAspect="1"/>
           </p:cNvPicPr>
@@ -5242,7 +5242,7 @@
         </p:blipFill>
         <p:spPr>
           <a:xfrm>
-            <a:off x="5820960" y="4677960"/>
+            <a:off x="5970960" y="4827960"/>
             <a:ext cx="1402080" cy="1402080"/>
           </a:xfrm>
           <a:prstGeom prst="rect">
@@ -5252,7 +5252,7 @@
       </p:pic>
       <p:pic>
         <p:nvPicPr>
-          <p:cNvPr id="37" name="Picture 36"/>
+          <p:cNvPr id="38" name="Picture 37"/>
           <p:cNvPicPr>
             <a:picLocks noChangeAspect="1"/>
           </p:cNvPicPr>
@@ -5272,7 +5272,7 @@
         </p:blipFill>
         <p:spPr>
           <a:xfrm>
-            <a:off x="5970960" y="4827960"/>
+            <a:off x="6120960" y="4977960"/>
             <a:ext cx="1402080" cy="1402080"/>
           </a:xfrm>
           <a:prstGeom prst="rect">
@@ -5282,7 +5282,7 @@
       </p:pic>
       <p:pic>
         <p:nvPicPr>
-          <p:cNvPr id="38" name="Picture 37"/>
+          <p:cNvPr id="39" name="Picture 38"/>
           <p:cNvPicPr>
             <a:picLocks noChangeAspect="1"/>
           </p:cNvPicPr>
@@ -5302,7 +5302,7 @@
         </p:blipFill>
         <p:spPr>
           <a:xfrm>
-            <a:off x="6120960" y="4977960"/>
+            <a:off x="6270960" y="5127960"/>
             <a:ext cx="1402080" cy="1402080"/>
           </a:xfrm>
           <a:prstGeom prst="rect">
@@ -5312,7 +5312,7 @@
       </p:pic>
       <p:pic>
         <p:nvPicPr>
-          <p:cNvPr id="39" name="Picture 38"/>
+          <p:cNvPr id="40" name="Picture 39"/>
           <p:cNvPicPr>
             <a:picLocks noChangeAspect="1"/>
           </p:cNvPicPr>
@@ -5332,7 +5332,7 @@
         </p:blipFill>
         <p:spPr>
           <a:xfrm>
-            <a:off x="6270960" y="5127960"/>
+            <a:off x="6420960" y="5277960"/>
             <a:ext cx="1402080" cy="1402080"/>
           </a:xfrm>
           <a:prstGeom prst="rect">
@@ -5342,7 +5342,7 @@
       </p:pic>
       <p:pic>
         <p:nvPicPr>
-          <p:cNvPr id="40" name="Picture 39"/>
+          <p:cNvPr id="41" name="Picture 40"/>
           <p:cNvPicPr>
             <a:picLocks noChangeAspect="1"/>
           </p:cNvPicPr>
@@ -5362,7 +5362,7 @@
         </p:blipFill>
         <p:spPr>
           <a:xfrm>
-            <a:off x="6420960" y="5277960"/>
+            <a:off x="6570960" y="5427960"/>
             <a:ext cx="1402080" cy="1402080"/>
           </a:xfrm>
           <a:prstGeom prst="rect">
@@ -5372,7 +5372,7 @@
       </p:pic>
       <p:pic>
         <p:nvPicPr>
-          <p:cNvPr id="41" name="Picture 40"/>
+          <p:cNvPr id="42" name="Picture 41"/>
           <p:cNvPicPr>
             <a:picLocks noChangeAspect="1"/>
           </p:cNvPicPr>
@@ -5392,7 +5392,7 @@
         </p:blipFill>
         <p:spPr>
           <a:xfrm>
-            <a:off x="6570960" y="5427960"/>
+            <a:off x="6720960" y="5577960"/>
             <a:ext cx="1402080" cy="1402080"/>
           </a:xfrm>
           <a:prstGeom prst="rect">
@@ -5402,7 +5402,7 @@
       </p:pic>
       <p:pic>
         <p:nvPicPr>
-          <p:cNvPr id="42" name="Picture 41"/>
+          <p:cNvPr id="43" name="Picture 42"/>
           <p:cNvPicPr>
             <a:picLocks noChangeAspect="1"/>
           </p:cNvPicPr>
@@ -5422,7 +5422,7 @@
         </p:blipFill>
         <p:spPr>
           <a:xfrm>
-            <a:off x="6720960" y="5577960"/>
+            <a:off x="6870960" y="5727960"/>
             <a:ext cx="1402080" cy="1402080"/>
           </a:xfrm>
           <a:prstGeom prst="rect">
@@ -5432,7 +5432,7 @@
       </p:pic>
       <p:pic>
         <p:nvPicPr>
-          <p:cNvPr id="43" name="Picture 42"/>
+          <p:cNvPr id="44" name="Picture 43"/>
           <p:cNvPicPr>
             <a:picLocks noChangeAspect="1"/>
           </p:cNvPicPr>
@@ -5452,7 +5452,7 @@
         </p:blipFill>
         <p:spPr>
           <a:xfrm>
-            <a:off x="6870960" y="5727960"/>
+            <a:off x="7020960" y="5877960"/>
             <a:ext cx="1402080" cy="1402080"/>
           </a:xfrm>
           <a:prstGeom prst="rect">
@@ -5462,7 +5462,7 @@
       </p:pic>
       <p:pic>
         <p:nvPicPr>
-          <p:cNvPr id="44" name="Picture 43"/>
+          <p:cNvPr id="45" name="Picture 44"/>
           <p:cNvPicPr>
             <a:picLocks noChangeAspect="1"/>
           </p:cNvPicPr>
@@ -5482,7 +5482,7 @@
         </p:blipFill>
         <p:spPr>
           <a:xfrm>
-            <a:off x="7020960" y="5877960"/>
+            <a:off x="7170960" y="6027960"/>
             <a:ext cx="1402080" cy="1402080"/>
           </a:xfrm>
           <a:prstGeom prst="rect">
@@ -5492,7 +5492,7 @@
       </p:pic>
       <p:pic>
         <p:nvPicPr>
-          <p:cNvPr id="45" name="Picture 44"/>
+          <p:cNvPr id="46" name="Picture 45"/>
           <p:cNvPicPr>
             <a:picLocks noChangeAspect="1"/>
           </p:cNvPicPr>
@@ -5512,7 +5512,7 @@
         </p:blipFill>
         <p:spPr>
           <a:xfrm>
-            <a:off x="7170960" y="6027960"/>
+            <a:off x="7320960" y="6177960"/>
             <a:ext cx="1402080" cy="1402080"/>
           </a:xfrm>
           <a:prstGeom prst="rect">
@@ -5522,7 +5522,7 @@
       </p:pic>
       <p:pic>
         <p:nvPicPr>
-          <p:cNvPr id="46" name="Picture 45"/>
+          <p:cNvPr id="47" name="Picture 46"/>
           <p:cNvPicPr>
             <a:picLocks noChangeAspect="1"/>
           </p:cNvPicPr>
@@ -5542,7 +5542,7 @@
         </p:blipFill>
         <p:spPr>
           <a:xfrm>
-            <a:off x="7320960" y="6177960"/>
+            <a:off x="7470960" y="6327960"/>
             <a:ext cx="1402080" cy="1402080"/>
           </a:xfrm>
           <a:prstGeom prst="rect">
@@ -5552,7 +5552,7 @@
       </p:pic>
       <p:pic>
         <p:nvPicPr>
-          <p:cNvPr id="47" name="Picture 46"/>
+          <p:cNvPr id="48" name="Picture 47"/>
           <p:cNvPicPr>
             <a:picLocks noChangeAspect="1"/>
           </p:cNvPicPr>
@@ -5572,7 +5572,7 @@
         </p:blipFill>
         <p:spPr>
           <a:xfrm>
-            <a:off x="7470960" y="6327960"/>
+            <a:off x="7620960" y="6477960"/>
             <a:ext cx="1402080" cy="1402080"/>
           </a:xfrm>
           <a:prstGeom prst="rect">
@@ -5582,7 +5582,7 @@
       </p:pic>
       <p:pic>
         <p:nvPicPr>
-          <p:cNvPr id="48" name="Picture 47"/>
+          <p:cNvPr id="49" name="Picture 48"/>
           <p:cNvPicPr>
             <a:picLocks noChangeAspect="1"/>
           </p:cNvPicPr>
@@ -5602,247 +5602,7 @@
         </p:blipFill>
         <p:spPr>
           <a:xfrm>
-            <a:off x="7620960" y="6477960"/>
-            <a:ext cx="1402080" cy="1402080"/>
-          </a:xfrm>
-          <a:prstGeom prst="rect">
-            <a:avLst/>
-          </a:prstGeom>
-        </p:spPr>
-      </p:pic>
-      <p:pic>
-        <p:nvPicPr>
-          <p:cNvPr id="49" name="Picture 48"/>
-          <p:cNvPicPr>
-            <a:picLocks noChangeAspect="1"/>
-          </p:cNvPicPr>
-          <p:nvPr/>
-        </p:nvPicPr>
-        <p:blipFill>
-          <a:blip r:embed="rId36" cstate="print">
-            <a:extLst>
-              <a:ext uri="{28A0092B-C50C-407E-A947-70E740481C1C}">
-                <a14:useLocalDpi xmlns:a14="http://schemas.microsoft.com/office/drawing/2010/main" val="0"/>
-              </a:ext>
-            </a:extLst>
-          </a:blip>
-          <a:stretch>
-            <a:fillRect/>
-          </a:stretch>
-        </p:blipFill>
-        <p:spPr>
-          <a:xfrm>
-            <a:off x="7770960" y="6627960"/>
-            <a:ext cx="1402080" cy="1402080"/>
-          </a:xfrm>
-          <a:prstGeom prst="rect">
-            <a:avLst/>
-          </a:prstGeom>
-        </p:spPr>
-      </p:pic>
-      <p:pic>
-        <p:nvPicPr>
-          <p:cNvPr id="50" name="Picture 49"/>
-          <p:cNvPicPr>
-            <a:picLocks noChangeAspect="1"/>
-          </p:cNvPicPr>
-          <p:nvPr/>
-        </p:nvPicPr>
-        <p:blipFill>
-          <a:blip r:embed="rId37" cstate="print">
-            <a:extLst>
-              <a:ext uri="{28A0092B-C50C-407E-A947-70E740481C1C}">
-                <a14:useLocalDpi xmlns:a14="http://schemas.microsoft.com/office/drawing/2010/main" val="0"/>
-              </a:ext>
-            </a:extLst>
-          </a:blip>
-          <a:stretch>
-            <a:fillRect/>
-          </a:stretch>
-        </p:blipFill>
-        <p:spPr>
-          <a:xfrm>
-            <a:off x="7920960" y="6777960"/>
-            <a:ext cx="1402080" cy="1402080"/>
-          </a:xfrm>
-          <a:prstGeom prst="rect">
-            <a:avLst/>
-          </a:prstGeom>
-        </p:spPr>
-      </p:pic>
-      <p:pic>
-        <p:nvPicPr>
-          <p:cNvPr id="51" name="Picture 50"/>
-          <p:cNvPicPr>
-            <a:picLocks noChangeAspect="1"/>
-          </p:cNvPicPr>
-          <p:nvPr/>
-        </p:nvPicPr>
-        <p:blipFill>
-          <a:blip r:embed="rId38" cstate="print">
-            <a:extLst>
-              <a:ext uri="{28A0092B-C50C-407E-A947-70E740481C1C}">
-                <a14:useLocalDpi xmlns:a14="http://schemas.microsoft.com/office/drawing/2010/main" val="0"/>
-              </a:ext>
-            </a:extLst>
-          </a:blip>
-          <a:stretch>
-            <a:fillRect/>
-          </a:stretch>
-        </p:blipFill>
-        <p:spPr>
-          <a:xfrm>
-            <a:off x="8070960" y="6927960"/>
-            <a:ext cx="1402080" cy="1402080"/>
-          </a:xfrm>
-          <a:prstGeom prst="rect">
-            <a:avLst/>
-          </a:prstGeom>
-        </p:spPr>
-      </p:pic>
-      <p:pic>
-        <p:nvPicPr>
-          <p:cNvPr id="52" name="Picture 51"/>
-          <p:cNvPicPr>
-            <a:picLocks noChangeAspect="1"/>
-          </p:cNvPicPr>
-          <p:nvPr/>
-        </p:nvPicPr>
-        <p:blipFill>
-          <a:blip r:embed="rId39" cstate="print">
-            <a:extLst>
-              <a:ext uri="{28A0092B-C50C-407E-A947-70E740481C1C}">
-                <a14:useLocalDpi xmlns:a14="http://schemas.microsoft.com/office/drawing/2010/main" val="0"/>
-              </a:ext>
-            </a:extLst>
-          </a:blip>
-          <a:stretch>
-            <a:fillRect/>
-          </a:stretch>
-        </p:blipFill>
-        <p:spPr>
-          <a:xfrm>
-            <a:off x="8220960" y="7077960"/>
-            <a:ext cx="1402080" cy="1402080"/>
-          </a:xfrm>
-          <a:prstGeom prst="rect">
-            <a:avLst/>
-          </a:prstGeom>
-        </p:spPr>
-      </p:pic>
-      <p:pic>
-        <p:nvPicPr>
-          <p:cNvPr id="53" name="Picture 52"/>
-          <p:cNvPicPr>
-            <a:picLocks noChangeAspect="1"/>
-          </p:cNvPicPr>
-          <p:nvPr/>
-        </p:nvPicPr>
-        <p:blipFill>
-          <a:blip r:embed="rId40" cstate="print">
-            <a:extLst>
-              <a:ext uri="{28A0092B-C50C-407E-A947-70E740481C1C}">
-                <a14:useLocalDpi xmlns:a14="http://schemas.microsoft.com/office/drawing/2010/main" val="0"/>
-              </a:ext>
-            </a:extLst>
-          </a:blip>
-          <a:stretch>
-            <a:fillRect/>
-          </a:stretch>
-        </p:blipFill>
-        <p:spPr>
-          <a:xfrm>
-            <a:off x="8370960" y="7227960"/>
-            <a:ext cx="1402080" cy="1402080"/>
-          </a:xfrm>
-          <a:prstGeom prst="rect">
-            <a:avLst/>
-          </a:prstGeom>
-        </p:spPr>
-      </p:pic>
-      <p:pic>
-        <p:nvPicPr>
-          <p:cNvPr id="54" name="Picture 53"/>
-          <p:cNvPicPr>
-            <a:picLocks noChangeAspect="1"/>
-          </p:cNvPicPr>
-          <p:nvPr/>
-        </p:nvPicPr>
-        <p:blipFill>
-          <a:blip r:embed="rId41" cstate="print">
-            <a:extLst>
-              <a:ext uri="{28A0092B-C50C-407E-A947-70E740481C1C}">
-                <a14:useLocalDpi xmlns:a14="http://schemas.microsoft.com/office/drawing/2010/main" val="0"/>
-              </a:ext>
-            </a:extLst>
-          </a:blip>
-          <a:stretch>
-            <a:fillRect/>
-          </a:stretch>
-        </p:blipFill>
-        <p:spPr>
-          <a:xfrm>
-            <a:off x="8520960" y="7377960"/>
-            <a:ext cx="1402080" cy="1402080"/>
-          </a:xfrm>
-          <a:prstGeom prst="rect">
-            <a:avLst/>
-          </a:prstGeom>
-        </p:spPr>
-      </p:pic>
-      <p:pic>
-        <p:nvPicPr>
-          <p:cNvPr id="55" name="Picture 54"/>
-          <p:cNvPicPr>
-            <a:picLocks noChangeAspect="1"/>
-          </p:cNvPicPr>
-          <p:nvPr/>
-        </p:nvPicPr>
-        <p:blipFill>
-          <a:blip r:embed="rId42" cstate="print">
-            <a:extLst>
-              <a:ext uri="{28A0092B-C50C-407E-A947-70E740481C1C}">
-                <a14:useLocalDpi xmlns:a14="http://schemas.microsoft.com/office/drawing/2010/main" val="0"/>
-              </a:ext>
-            </a:extLst>
-          </a:blip>
-          <a:stretch>
-            <a:fillRect/>
-          </a:stretch>
-        </p:blipFill>
-        <p:spPr>
-          <a:xfrm>
-            <a:off x="8670960" y="7527960"/>
-            <a:ext cx="1402080" cy="1402080"/>
-          </a:xfrm>
-          <a:prstGeom prst="rect">
-            <a:avLst/>
-          </a:prstGeom>
-        </p:spPr>
-      </p:pic>
-      <p:pic>
-        <p:nvPicPr>
-          <p:cNvPr id="56" name="Picture 55"/>
-          <p:cNvPicPr>
-            <a:picLocks noChangeAspect="1"/>
-          </p:cNvPicPr>
-          <p:nvPr/>
-        </p:nvPicPr>
-        <p:blipFill>
-          <a:blip r:embed="rId43" cstate="print">
-            <a:extLst>
-              <a:ext uri="{28A0092B-C50C-407E-A947-70E740481C1C}">
-                <a14:useLocalDpi xmlns:a14="http://schemas.microsoft.com/office/drawing/2010/main" val="0"/>
-              </a:ext>
-            </a:extLst>
-          </a:blip>
-          <a:stretch>
-            <a:fillRect/>
-          </a:stretch>
-        </p:blipFill>
-        <p:spPr>
-          <a:xfrm>
-            <a:off x="2821965" y="1445599"/>
+            <a:off x="2810681" y="1429549"/>
             <a:ext cx="1402080" cy="1402080"/>
           </a:xfrm>
           <a:prstGeom prst="rect">

</xml_diff>